<commit_message>
all sorts of fun stuff
</commit_message>
<xml_diff>
--- a/AWEISS EMU GRC Presentation.pptx
+++ b/AWEISS EMU GRC Presentation.pptx
@@ -8,19 +8,22 @@
     <p:sldId id="257" r:id="rId2"/>
     <p:sldId id="258" r:id="rId3"/>
     <p:sldId id="259" r:id="rId4"/>
-    <p:sldId id="274" r:id="rId5"/>
-    <p:sldId id="260" r:id="rId6"/>
-    <p:sldId id="261" r:id="rId7"/>
-    <p:sldId id="267" r:id="rId8"/>
+    <p:sldId id="276" r:id="rId5"/>
+    <p:sldId id="274" r:id="rId6"/>
+    <p:sldId id="260" r:id="rId7"/>
+    <p:sldId id="279" r:id="rId8"/>
     <p:sldId id="271" r:id="rId9"/>
-    <p:sldId id="262" r:id="rId10"/>
-    <p:sldId id="263" r:id="rId11"/>
+    <p:sldId id="267" r:id="rId10"/>
+    <p:sldId id="262" r:id="rId11"/>
     <p:sldId id="264" r:id="rId12"/>
     <p:sldId id="265" r:id="rId13"/>
-    <p:sldId id="269" r:id="rId14"/>
-    <p:sldId id="272" r:id="rId15"/>
-    <p:sldId id="273" r:id="rId16"/>
-    <p:sldId id="275" r:id="rId17"/>
+    <p:sldId id="263" r:id="rId14"/>
+    <p:sldId id="277" r:id="rId15"/>
+    <p:sldId id="272" r:id="rId16"/>
+    <p:sldId id="278" r:id="rId17"/>
+    <p:sldId id="280" r:id="rId18"/>
+    <p:sldId id="273" r:id="rId19"/>
+    <p:sldId id="275" r:id="rId20"/>
   </p:sldIdLst>
   <p:sldSz cx="12192000" cy="6858000"/>
   <p:notesSz cx="6858000" cy="9144000"/>
@@ -119,6 +122,11 @@
       </a:defRPr>
     </a:lvl9pPr>
   </p:defaultTextStyle>
+  <p:extLst>
+    <p:ext uri="{EFAFB233-063F-42B5-8137-9DF3F51BA10A}">
+      <p15:sldGuideLst xmlns:p15="http://schemas.microsoft.com/office/powerpoint/2012/main"/>
+    </p:ext>
+  </p:extLst>
 </p:presentation>
 </file>
 
@@ -1788,7 +1796,7 @@
           <a:p>
             <a:fld id="{8F72BA41-EC5B-4197-BCC8-0FD2E523CD7A}" type="datetimeFigureOut">
               <a:rPr lang="en-US" smtClean="0"/>
-              <a:t>3/17/23</a:t>
+              <a:t>3/23/23</a:t>
             </a:fld>
             <a:endParaRPr lang="en-US"/>
           </a:p>
@@ -1991,7 +1999,7 @@
           <a:p>
             <a:fld id="{8F72BA41-EC5B-4197-BCC8-0FD2E523CD7A}" type="datetimeFigureOut">
               <a:rPr lang="en-US" smtClean="0"/>
-              <a:t>3/17/23</a:t>
+              <a:t>3/23/23</a:t>
             </a:fld>
             <a:endParaRPr lang="en-US"/>
           </a:p>
@@ -3712,7 +3720,7 @@
           <a:p>
             <a:fld id="{8F72BA41-EC5B-4197-BCC8-0FD2E523CD7A}" type="datetimeFigureOut">
               <a:rPr lang="en-US" smtClean="0"/>
-              <a:t>3/17/23</a:t>
+              <a:t>3/23/23</a:t>
             </a:fld>
             <a:endParaRPr lang="en-US"/>
           </a:p>
@@ -3911,7 +3919,7 @@
           <a:p>
             <a:fld id="{8F72BA41-EC5B-4197-BCC8-0FD2E523CD7A}" type="datetimeFigureOut">
               <a:rPr lang="en-US" smtClean="0"/>
-              <a:t>3/17/23</a:t>
+              <a:t>3/23/23</a:t>
             </a:fld>
             <a:endParaRPr lang="en-US"/>
           </a:p>
@@ -5701,7 +5709,7 @@
           <a:p>
             <a:fld id="{8F72BA41-EC5B-4197-BCC8-0FD2E523CD7A}" type="datetimeFigureOut">
               <a:rPr lang="en-US" smtClean="0"/>
-              <a:t>3/17/23</a:t>
+              <a:t>3/23/23</a:t>
             </a:fld>
             <a:endParaRPr lang="en-US"/>
           </a:p>
@@ -5974,7 +5982,7 @@
           <a:p>
             <a:fld id="{8F72BA41-EC5B-4197-BCC8-0FD2E523CD7A}" type="datetimeFigureOut">
               <a:rPr lang="en-US" smtClean="0"/>
-              <a:t>3/17/23</a:t>
+              <a:t>3/23/23</a:t>
             </a:fld>
             <a:endParaRPr lang="en-US"/>
           </a:p>
@@ -6394,7 +6402,7 @@
           <a:p>
             <a:fld id="{8F72BA41-EC5B-4197-BCC8-0FD2E523CD7A}" type="datetimeFigureOut">
               <a:rPr lang="en-US" smtClean="0"/>
-              <a:t>3/17/23</a:t>
+              <a:t>3/23/23</a:t>
             </a:fld>
             <a:endParaRPr lang="en-US"/>
           </a:p>
@@ -6550,7 +6558,7 @@
           <a:p>
             <a:fld id="{8F72BA41-EC5B-4197-BCC8-0FD2E523CD7A}" type="datetimeFigureOut">
               <a:rPr lang="en-US" smtClean="0"/>
-              <a:t>3/17/23</a:t>
+              <a:t>3/23/23</a:t>
             </a:fld>
             <a:endParaRPr lang="en-US"/>
           </a:p>
@@ -8118,7 +8126,7 @@
           <a:p>
             <a:fld id="{8F72BA41-EC5B-4197-BCC8-0FD2E523CD7A}" type="datetimeFigureOut">
               <a:rPr lang="en-US" smtClean="0"/>
-              <a:t>3/17/23</a:t>
+              <a:t>3/23/23</a:t>
             </a:fld>
             <a:endParaRPr lang="en-US"/>
           </a:p>
@@ -9969,7 +9977,7 @@
           <a:p>
             <a:fld id="{8F72BA41-EC5B-4197-BCC8-0FD2E523CD7A}" type="datetimeFigureOut">
               <a:rPr lang="en-US" smtClean="0"/>
-              <a:t>3/17/23</a:t>
+              <a:t>3/23/23</a:t>
             </a:fld>
             <a:endParaRPr lang="en-US"/>
           </a:p>
@@ -11782,7 +11790,7 @@
           <a:p>
             <a:fld id="{8F72BA41-EC5B-4197-BCC8-0FD2E523CD7A}" type="datetimeFigureOut">
               <a:rPr lang="en-US" smtClean="0"/>
-              <a:t>3/17/23</a:t>
+              <a:t>3/23/23</a:t>
             </a:fld>
             <a:endParaRPr lang="en-US"/>
           </a:p>
@@ -13476,7 +13484,7 @@
             <a:fld id="{8F72BA41-EC5B-4197-BCC8-0FD2E523CD7A}" type="datetimeFigureOut">
               <a:rPr lang="en-US" smtClean="0"/>
               <a:pPr/>
-              <a:t>3/17/23</a:t>
+              <a:t>3/23/23</a:t>
             </a:fld>
             <a:endParaRPr lang="en-US" dirty="0"/>
           </a:p>
@@ -16049,7 +16057,7 @@
           <a:p>
             <a:r>
               <a:rPr lang="en-US" dirty="0"/>
-              <a:t>Experiment 2</a:t>
+              <a:t>Experiment 1</a:t>
             </a:r>
           </a:p>
         </p:txBody>
@@ -16072,16 +16080,70 @@
         </p:nvSpPr>
         <p:spPr/>
         <p:txBody>
-          <a:bodyPr/>
+          <a:bodyPr>
+            <a:normAutofit fontScale="92500"/>
+          </a:bodyPr>
           <a:lstStyle/>
           <a:p>
             <a:endParaRPr lang="en-US" dirty="0"/>
           </a:p>
           <a:p>
             <a:r>
-              <a:rPr lang="en-US" dirty="0"/>
-              <a:t>Comparing all generated data to the original source</a:t>
+              <a:rPr lang="en-US" sz="2800" dirty="0"/>
+              <a:t>Getting ChatGPT to create content in the style of human writers in  </a:t>
             </a:r>
+          </a:p>
+          <a:p>
+            <a:pPr lvl="2"/>
+            <a:r>
+              <a:rPr lang="en-US" sz="2000" dirty="0"/>
+              <a:t>6</a:t>
+            </a:r>
+            <a:r>
+              <a:rPr lang="en-US" sz="2000" baseline="30000" dirty="0"/>
+              <a:t>th</a:t>
+            </a:r>
+            <a:r>
+              <a:rPr lang="en-US" sz="2000" dirty="0"/>
+              <a:t> grade</a:t>
+            </a:r>
+          </a:p>
+          <a:p>
+            <a:pPr lvl="2"/>
+            <a:r>
+              <a:rPr lang="en-US" sz="2000" dirty="0"/>
+              <a:t>10</a:t>
+            </a:r>
+            <a:r>
+              <a:rPr lang="en-US" sz="2000" baseline="30000" dirty="0"/>
+              <a:t>th</a:t>
+            </a:r>
+            <a:r>
+              <a:rPr lang="en-US" sz="2000" dirty="0"/>
+              <a:t> grade</a:t>
+            </a:r>
+          </a:p>
+          <a:p>
+            <a:pPr lvl="2"/>
+            <a:r>
+              <a:rPr lang="en-US" sz="2000" dirty="0"/>
+              <a:t>College</a:t>
+            </a:r>
+          </a:p>
+          <a:p>
+            <a:r>
+              <a:rPr lang="en-US" sz="2800" dirty="0"/>
+              <a:t>Running dataset through classification model</a:t>
+            </a:r>
+          </a:p>
+          <a:p>
+            <a:r>
+              <a:rPr lang="en-US" sz="2800" dirty="0"/>
+              <a:t>Analyze results</a:t>
+            </a:r>
+          </a:p>
+          <a:p>
+            <a:endParaRPr lang="en-US" sz="2800" dirty="0"/>
           </a:p>
           <a:p>
             <a:pPr marL="0" indent="0">
@@ -16094,7 +16156,7 @@
     </p:spTree>
     <p:extLst>
       <p:ext uri="{BB962C8B-B14F-4D97-AF65-F5344CB8AC3E}">
-        <p14:creationId xmlns:p14="http://schemas.microsoft.com/office/powerpoint/2010/main" val="4063682167"/>
+        <p14:creationId xmlns:p14="http://schemas.microsoft.com/office/powerpoint/2010/main" val="2226708957"/>
       </p:ext>
     </p:extLst>
   </p:cSld>
@@ -16139,12 +16201,30 @@
         </p:nvSpPr>
         <p:spPr/>
         <p:txBody>
-          <a:bodyPr/>
+          <a:bodyPr>
+            <a:normAutofit/>
+          </a:bodyPr>
           <a:lstStyle/>
           <a:p>
             <a:r>
-              <a:rPr lang="en-US" dirty="0"/>
-              <a:t>Results: Experiment 1</a:t>
+              <a:rPr lang="en-US" sz="4000" dirty="0"/>
+              <a:t>Results: AI - 6</a:t>
+            </a:r>
+            <a:r>
+              <a:rPr lang="en-US" sz="4000" baseline="30000" dirty="0"/>
+              <a:t>th</a:t>
+            </a:r>
+            <a:r>
+              <a:rPr lang="en-US" sz="4000" dirty="0"/>
+              <a:t> Grade vs. 10</a:t>
+            </a:r>
+            <a:r>
+              <a:rPr lang="en-US" sz="4000" baseline="30000" dirty="0"/>
+              <a:t>th</a:t>
+            </a:r>
+            <a:r>
+              <a:rPr lang="en-US" sz="4000" dirty="0"/>
+              <a:t> vs College</a:t>
             </a:r>
           </a:p>
         </p:txBody>
@@ -16284,36 +16364,6 @@
           </a:p>
         </p:txBody>
       </p:sp>
-      <p:pic>
-        <p:nvPicPr>
-          <p:cNvPr id="12" name="Picture 11">
-            <a:extLst>
-              <a:ext uri="{FF2B5EF4-FFF2-40B4-BE49-F238E27FC236}">
-                <a16:creationId xmlns:a16="http://schemas.microsoft.com/office/drawing/2014/main" id="{CF8F94F4-E34C-963B-81BD-CD9CC49A2317}"/>
-              </a:ext>
-            </a:extLst>
-          </p:cNvPr>
-          <p:cNvPicPr>
-            <a:picLocks noChangeAspect="1"/>
-          </p:cNvPicPr>
-          <p:nvPr/>
-        </p:nvPicPr>
-        <p:blipFill>
-          <a:blip r:embed="rId2"/>
-          <a:stretch>
-            <a:fillRect/>
-          </a:stretch>
-        </p:blipFill>
-        <p:spPr>
-          <a:xfrm>
-            <a:off x="4272290" y="2724094"/>
-            <a:ext cx="4550436" cy="3371906"/>
-          </a:xfrm>
-          <a:prstGeom prst="rect">
-            <a:avLst/>
-          </a:prstGeom>
-        </p:spPr>
-      </p:pic>
       <p:sp>
         <p:nvSpPr>
           <p:cNvPr id="13" name="TextBox 12">
@@ -16328,7 +16378,7 @@
         </p:nvSpPr>
         <p:spPr>
           <a:xfrm rot="16200000">
-            <a:off x="3438190" y="4122368"/>
+            <a:off x="341821" y="4059937"/>
             <a:ext cx="1146468" cy="369332"/>
           </a:xfrm>
           <a:prstGeom prst="rect">
@@ -16363,7 +16413,7 @@
         </p:nvSpPr>
         <p:spPr>
           <a:xfrm>
-            <a:off x="5508601" y="6063734"/>
+            <a:off x="2412232" y="6001303"/>
             <a:ext cx="2077813" cy="369332"/>
           </a:xfrm>
           <a:prstGeom prst="rect">
@@ -16384,6 +16434,136 @@
           </a:p>
         </p:txBody>
       </p:sp>
+      <p:pic>
+        <p:nvPicPr>
+          <p:cNvPr id="4" name="Picture 3">
+            <a:extLst>
+              <a:ext uri="{FF2B5EF4-FFF2-40B4-BE49-F238E27FC236}">
+                <a16:creationId xmlns:a16="http://schemas.microsoft.com/office/drawing/2014/main" id="{8E8CB515-32AE-CC30-0A58-1AD524F27AED}"/>
+              </a:ext>
+            </a:extLst>
+          </p:cNvPr>
+          <p:cNvPicPr>
+            <a:picLocks noChangeAspect="1"/>
+          </p:cNvPicPr>
+          <p:nvPr/>
+        </p:nvPicPr>
+        <p:blipFill>
+          <a:blip r:embed="rId2"/>
+          <a:stretch>
+            <a:fillRect/>
+          </a:stretch>
+        </p:blipFill>
+        <p:spPr>
+          <a:xfrm>
+            <a:off x="1168237" y="2690514"/>
+            <a:ext cx="4556476" cy="3281937"/>
+          </a:xfrm>
+          <a:prstGeom prst="rect">
+            <a:avLst/>
+          </a:prstGeom>
+        </p:spPr>
+      </p:pic>
+      <p:sp>
+        <p:nvSpPr>
+          <p:cNvPr id="15" name="TextBox 14">
+            <a:extLst>
+              <a:ext uri="{FF2B5EF4-FFF2-40B4-BE49-F238E27FC236}">
+                <a16:creationId xmlns:a16="http://schemas.microsoft.com/office/drawing/2014/main" id="{6714C3B2-B047-2B3C-183E-22C47D8942A9}"/>
+              </a:ext>
+            </a:extLst>
+          </p:cNvPr>
+          <p:cNvSpPr txBox="1"/>
+          <p:nvPr/>
+        </p:nvSpPr>
+        <p:spPr>
+          <a:xfrm rot="16200000">
+            <a:off x="6085937" y="3937702"/>
+            <a:ext cx="670376" cy="369332"/>
+          </a:xfrm>
+          <a:prstGeom prst="rect">
+            <a:avLst/>
+          </a:prstGeom>
+          <a:noFill/>
+        </p:spPr>
+        <p:txBody>
+          <a:bodyPr wrap="none" rtlCol="0">
+            <a:spAutoFit/>
+          </a:bodyPr>
+          <a:lstStyle/>
+          <a:p>
+            <a:r>
+              <a:rPr lang="en-US" dirty="0"/>
+              <a:t>Loss</a:t>
+            </a:r>
+          </a:p>
+        </p:txBody>
+      </p:sp>
+      <p:sp>
+        <p:nvSpPr>
+          <p:cNvPr id="16" name="TextBox 15">
+            <a:extLst>
+              <a:ext uri="{FF2B5EF4-FFF2-40B4-BE49-F238E27FC236}">
+                <a16:creationId xmlns:a16="http://schemas.microsoft.com/office/drawing/2014/main" id="{EA198330-4241-5207-8F14-C7B5E5E8669B}"/>
+              </a:ext>
+            </a:extLst>
+          </p:cNvPr>
+          <p:cNvSpPr txBox="1"/>
+          <p:nvPr/>
+        </p:nvSpPr>
+        <p:spPr>
+          <a:xfrm>
+            <a:off x="7918301" y="5879068"/>
+            <a:ext cx="2077813" cy="369332"/>
+          </a:xfrm>
+          <a:prstGeom prst="rect">
+            <a:avLst/>
+          </a:prstGeom>
+          <a:noFill/>
+        </p:spPr>
+        <p:txBody>
+          <a:bodyPr wrap="none" rtlCol="0">
+            <a:spAutoFit/>
+          </a:bodyPr>
+          <a:lstStyle/>
+          <a:p>
+            <a:r>
+              <a:rPr lang="en-US" dirty="0"/>
+              <a:t>Training Iterations</a:t>
+            </a:r>
+          </a:p>
+        </p:txBody>
+      </p:sp>
+      <p:pic>
+        <p:nvPicPr>
+          <p:cNvPr id="17" name="Picture 16">
+            <a:extLst>
+              <a:ext uri="{FF2B5EF4-FFF2-40B4-BE49-F238E27FC236}">
+                <a16:creationId xmlns:a16="http://schemas.microsoft.com/office/drawing/2014/main" id="{2392C16D-5DBD-4148-5921-3928055AEE8D}"/>
+              </a:ext>
+            </a:extLst>
+          </p:cNvPr>
+          <p:cNvPicPr>
+            <a:picLocks noChangeAspect="1"/>
+          </p:cNvPicPr>
+          <p:nvPr/>
+        </p:nvPicPr>
+        <p:blipFill>
+          <a:blip r:embed="rId3"/>
+          <a:stretch>
+            <a:fillRect/>
+          </a:stretch>
+        </p:blipFill>
+        <p:spPr>
+          <a:xfrm>
+            <a:off x="6643078" y="2678998"/>
+            <a:ext cx="4556476" cy="3293453"/>
+          </a:xfrm>
+          <a:prstGeom prst="rect">
+            <a:avLst/>
+          </a:prstGeom>
+        </p:spPr>
+      </p:pic>
     </p:spTree>
     <p:extLst>
       <p:ext uri="{BB962C8B-B14F-4D97-AF65-F5344CB8AC3E}">
@@ -16592,7 +16772,7 @@
           <p:nvPr>
             <p:extLst>
               <p:ext uri="{D42A27DB-BD31-4B8C-83A1-F6EECF244321}">
-                <p14:modId xmlns:p14="http://schemas.microsoft.com/office/powerpoint/2010/main" val="2233590178"/>
+                <p14:modId xmlns:p14="http://schemas.microsoft.com/office/powerpoint/2010/main" val="1621804789"/>
               </p:ext>
             </p:extLst>
           </p:nvPr>
@@ -16875,7 +17055,125 @@
           <a:p>
             <a:r>
               <a:rPr lang="en-US" dirty="0"/>
-              <a:t>Results: Experiment 2</a:t>
+              <a:t>Experiment 2</a:t>
+            </a:r>
+          </a:p>
+        </p:txBody>
+      </p:sp>
+      <p:sp>
+        <p:nvSpPr>
+          <p:cNvPr id="3" name="Content Placeholder 2">
+            <a:extLst>
+              <a:ext uri="{FF2B5EF4-FFF2-40B4-BE49-F238E27FC236}">
+                <a16:creationId xmlns:a16="http://schemas.microsoft.com/office/drawing/2014/main" id="{69B6741D-4C11-9AD4-5F3A-2307F06E2A3A}"/>
+              </a:ext>
+            </a:extLst>
+          </p:cNvPr>
+          <p:cNvSpPr>
+            <a:spLocks noGrp="1"/>
+          </p:cNvSpPr>
+          <p:nvPr>
+            <p:ph idx="1"/>
+          </p:nvPr>
+        </p:nvSpPr>
+        <p:spPr/>
+        <p:txBody>
+          <a:bodyPr/>
+          <a:lstStyle/>
+          <a:p>
+            <a:endParaRPr lang="en-US" dirty="0"/>
+          </a:p>
+          <a:p>
+            <a:r>
+              <a:rPr lang="en-US" dirty="0"/>
+              <a:t>Comparing all generated data to the original source</a:t>
+            </a:r>
+          </a:p>
+          <a:p>
+            <a:r>
+              <a:rPr lang="en-US" dirty="0"/>
+              <a:t>300 Ai written articles vs. 150 human written</a:t>
+            </a:r>
+          </a:p>
+          <a:p>
+            <a:pPr lvl="1"/>
+            <a:r>
+              <a:rPr lang="en-US" dirty="0"/>
+              <a:t>Original </a:t>
+            </a:r>
+            <a:r>
+              <a:rPr lang="en-US" dirty="0" err="1"/>
+              <a:t>srouce</a:t>
+            </a:r>
+            <a:r>
+              <a:rPr lang="en-US" dirty="0"/>
+              <a:t> articles and new unseen articles</a:t>
+            </a:r>
+          </a:p>
+          <a:p>
+            <a:pPr marL="0" indent="0">
+              <a:buNone/>
+            </a:pPr>
+            <a:endParaRPr lang="en-US" dirty="0"/>
+          </a:p>
+        </p:txBody>
+      </p:sp>
+    </p:spTree>
+    <p:extLst>
+      <p:ext uri="{BB962C8B-B14F-4D97-AF65-F5344CB8AC3E}">
+        <p14:creationId xmlns:p14="http://schemas.microsoft.com/office/powerpoint/2010/main" val="4063682167"/>
+      </p:ext>
+    </p:extLst>
+  </p:cSld>
+  <p:clrMapOvr>
+    <a:masterClrMapping/>
+  </p:clrMapOvr>
+</p:sld>
+</file>
+
+<file path=ppt/slides/slide14.xml><?xml version="1.0" encoding="utf-8"?>
+<p:sld xmlns:a="http://schemas.openxmlformats.org/drawingml/2006/main" xmlns:r="http://schemas.openxmlformats.org/officeDocument/2006/relationships" xmlns:p="http://schemas.openxmlformats.org/presentationml/2006/main">
+  <p:cSld>
+    <p:spTree>
+      <p:nvGrpSpPr>
+        <p:cNvPr id="1" name=""/>
+        <p:cNvGrpSpPr/>
+        <p:nvPr/>
+      </p:nvGrpSpPr>
+      <p:grpSpPr>
+        <a:xfrm>
+          <a:off x="0" y="0"/>
+          <a:ext cx="0" cy="0"/>
+          <a:chOff x="0" y="0"/>
+          <a:chExt cx="0" cy="0"/>
+        </a:xfrm>
+      </p:grpSpPr>
+      <p:sp>
+        <p:nvSpPr>
+          <p:cNvPr id="2" name="Title 1">
+            <a:extLst>
+              <a:ext uri="{FF2B5EF4-FFF2-40B4-BE49-F238E27FC236}">
+                <a16:creationId xmlns:a16="http://schemas.microsoft.com/office/drawing/2014/main" id="{45B9EF4B-429B-A002-82A5-51F47ACCD418}"/>
+              </a:ext>
+            </a:extLst>
+          </p:cNvPr>
+          <p:cNvSpPr>
+            <a:spLocks noGrp="1"/>
+          </p:cNvSpPr>
+          <p:nvPr>
+            <p:ph type="title"/>
+          </p:nvPr>
+        </p:nvSpPr>
+        <p:spPr/>
+        <p:txBody>
+          <a:bodyPr>
+            <a:normAutofit/>
+          </a:bodyPr>
+          <a:lstStyle/>
+          <a:p>
+            <a:r>
+              <a:rPr lang="en-US" sz="4000" dirty="0"/>
+              <a:t>Results: AI vs. Human Writing</a:t>
             </a:r>
           </a:p>
         </p:txBody>
@@ -17015,36 +17313,6 @@
           </a:p>
         </p:txBody>
       </p:sp>
-      <p:pic>
-        <p:nvPicPr>
-          <p:cNvPr id="12" name="Picture 11">
-            <a:extLst>
-              <a:ext uri="{FF2B5EF4-FFF2-40B4-BE49-F238E27FC236}">
-                <a16:creationId xmlns:a16="http://schemas.microsoft.com/office/drawing/2014/main" id="{CF8F94F4-E34C-963B-81BD-CD9CC49A2317}"/>
-              </a:ext>
-            </a:extLst>
-          </p:cNvPr>
-          <p:cNvPicPr>
-            <a:picLocks noChangeAspect="1"/>
-          </p:cNvPicPr>
-          <p:nvPr/>
-        </p:nvPicPr>
-        <p:blipFill>
-          <a:blip r:embed="rId2"/>
-          <a:stretch>
-            <a:fillRect/>
-          </a:stretch>
-        </p:blipFill>
-        <p:spPr>
-          <a:xfrm>
-            <a:off x="4272290" y="2724094"/>
-            <a:ext cx="4550436" cy="3371906"/>
-          </a:xfrm>
-          <a:prstGeom prst="rect">
-            <a:avLst/>
-          </a:prstGeom>
-        </p:spPr>
-      </p:pic>
       <p:sp>
         <p:nvSpPr>
           <p:cNvPr id="13" name="TextBox 12">
@@ -17059,7 +17327,7 @@
         </p:nvSpPr>
         <p:spPr>
           <a:xfrm rot="16200000">
-            <a:off x="3438190" y="4122368"/>
+            <a:off x="341821" y="4059937"/>
             <a:ext cx="1146468" cy="369332"/>
           </a:xfrm>
           <a:prstGeom prst="rect">
@@ -17094,7 +17362,7 @@
         </p:nvSpPr>
         <p:spPr>
           <a:xfrm>
-            <a:off x="5508601" y="6063734"/>
+            <a:off x="2412232" y="6001303"/>
             <a:ext cx="2077813" cy="369332"/>
           </a:xfrm>
           <a:prstGeom prst="rect">
@@ -17115,10 +17383,138 @@
           </a:p>
         </p:txBody>
       </p:sp>
+      <p:pic>
+        <p:nvPicPr>
+          <p:cNvPr id="4" name="Picture 3">
+            <a:extLst>
+              <a:ext uri="{FF2B5EF4-FFF2-40B4-BE49-F238E27FC236}">
+                <a16:creationId xmlns:a16="http://schemas.microsoft.com/office/drawing/2014/main" id="{8E8CB515-32AE-CC30-0A58-1AD524F27AED}"/>
+              </a:ext>
+            </a:extLst>
+          </p:cNvPr>
+          <p:cNvPicPr>
+            <a:picLocks noChangeAspect="1"/>
+          </p:cNvPicPr>
+          <p:nvPr/>
+        </p:nvPicPr>
+        <p:blipFill>
+          <a:blip r:embed="rId2"/>
+          <a:srcRect/>
+          <a:stretch/>
+        </p:blipFill>
+        <p:spPr>
+          <a:xfrm>
+            <a:off x="1200101" y="2690514"/>
+            <a:ext cx="4492748" cy="3281937"/>
+          </a:xfrm>
+          <a:prstGeom prst="rect">
+            <a:avLst/>
+          </a:prstGeom>
+        </p:spPr>
+      </p:pic>
+      <p:sp>
+        <p:nvSpPr>
+          <p:cNvPr id="15" name="TextBox 14">
+            <a:extLst>
+              <a:ext uri="{FF2B5EF4-FFF2-40B4-BE49-F238E27FC236}">
+                <a16:creationId xmlns:a16="http://schemas.microsoft.com/office/drawing/2014/main" id="{6714C3B2-B047-2B3C-183E-22C47D8942A9}"/>
+              </a:ext>
+            </a:extLst>
+          </p:cNvPr>
+          <p:cNvSpPr txBox="1"/>
+          <p:nvPr/>
+        </p:nvSpPr>
+        <p:spPr>
+          <a:xfrm rot="16200000">
+            <a:off x="6085937" y="3937702"/>
+            <a:ext cx="670376" cy="369332"/>
+          </a:xfrm>
+          <a:prstGeom prst="rect">
+            <a:avLst/>
+          </a:prstGeom>
+          <a:noFill/>
+        </p:spPr>
+        <p:txBody>
+          <a:bodyPr wrap="none" rtlCol="0">
+            <a:spAutoFit/>
+          </a:bodyPr>
+          <a:lstStyle/>
+          <a:p>
+            <a:r>
+              <a:rPr lang="en-US" dirty="0"/>
+              <a:t>Loss</a:t>
+            </a:r>
+          </a:p>
+        </p:txBody>
+      </p:sp>
+      <p:sp>
+        <p:nvSpPr>
+          <p:cNvPr id="16" name="TextBox 15">
+            <a:extLst>
+              <a:ext uri="{FF2B5EF4-FFF2-40B4-BE49-F238E27FC236}">
+                <a16:creationId xmlns:a16="http://schemas.microsoft.com/office/drawing/2014/main" id="{EA198330-4241-5207-8F14-C7B5E5E8669B}"/>
+              </a:ext>
+            </a:extLst>
+          </p:cNvPr>
+          <p:cNvSpPr txBox="1"/>
+          <p:nvPr/>
+        </p:nvSpPr>
+        <p:spPr>
+          <a:xfrm>
+            <a:off x="7918301" y="5879068"/>
+            <a:ext cx="2077813" cy="369332"/>
+          </a:xfrm>
+          <a:prstGeom prst="rect">
+            <a:avLst/>
+          </a:prstGeom>
+          <a:noFill/>
+        </p:spPr>
+        <p:txBody>
+          <a:bodyPr wrap="none" rtlCol="0">
+            <a:spAutoFit/>
+          </a:bodyPr>
+          <a:lstStyle/>
+          <a:p>
+            <a:r>
+              <a:rPr lang="en-US" dirty="0"/>
+              <a:t>Training Iterations</a:t>
+            </a:r>
+          </a:p>
+        </p:txBody>
+      </p:sp>
+      <p:pic>
+        <p:nvPicPr>
+          <p:cNvPr id="17" name="Picture 16">
+            <a:extLst>
+              <a:ext uri="{FF2B5EF4-FFF2-40B4-BE49-F238E27FC236}">
+                <a16:creationId xmlns:a16="http://schemas.microsoft.com/office/drawing/2014/main" id="{2392C16D-5DBD-4148-5921-3928055AEE8D}"/>
+              </a:ext>
+            </a:extLst>
+          </p:cNvPr>
+          <p:cNvPicPr>
+            <a:picLocks noChangeAspect="1"/>
+          </p:cNvPicPr>
+          <p:nvPr/>
+        </p:nvPicPr>
+        <p:blipFill>
+          <a:blip r:embed="rId3"/>
+          <a:srcRect/>
+          <a:stretch/>
+        </p:blipFill>
+        <p:spPr>
+          <a:xfrm>
+            <a:off x="6699035" y="2678998"/>
+            <a:ext cx="4444562" cy="3293453"/>
+          </a:xfrm>
+          <a:prstGeom prst="rect">
+            <a:avLst/>
+          </a:prstGeom>
+        </p:spPr>
+      </p:pic>
     </p:spTree>
     <p:extLst>
       <p:ext uri="{BB962C8B-B14F-4D97-AF65-F5344CB8AC3E}">
-        <p14:creationId xmlns:p14="http://schemas.microsoft.com/office/powerpoint/2010/main" val="3428151691"/>
+        <p14:creationId xmlns:p14="http://schemas.microsoft.com/office/powerpoint/2010/main" val="3672019539"/>
       </p:ext>
     </p:extLst>
   </p:cSld>
@@ -17128,7 +17524,7 @@
 </p:sld>
 </file>
 
-<file path=ppt/slides/slide14.xml><?xml version="1.0" encoding="utf-8"?>
+<file path=ppt/slides/slide15.xml><?xml version="1.0" encoding="utf-8"?>
 <p:sld xmlns:a="http://schemas.openxmlformats.org/drawingml/2006/main" xmlns:r="http://schemas.openxmlformats.org/officeDocument/2006/relationships" xmlns:p="http://schemas.openxmlformats.org/presentationml/2006/main">
   <p:cSld>
     <p:spTree>
@@ -17191,46 +17587,55 @@
         </p:nvSpPr>
         <p:spPr/>
         <p:txBody>
-          <a:bodyPr/>
+          <a:bodyPr>
+            <a:normAutofit/>
+          </a:bodyPr>
           <a:lstStyle/>
           <a:p>
             <a:r>
-              <a:rPr lang="en-US" dirty="0"/>
+              <a:rPr lang="en-US" sz="2800" dirty="0"/>
               <a:t>100% Accuracy? Problem solved!</a:t>
             </a:r>
           </a:p>
           <a:p>
             <a:r>
-              <a:rPr lang="en-US" dirty="0"/>
+              <a:rPr lang="en-US" sz="2800" dirty="0"/>
               <a:t>Unfortunately, probably not.</a:t>
             </a:r>
           </a:p>
           <a:p>
             <a:pPr lvl="1"/>
             <a:r>
-              <a:rPr lang="en-US" dirty="0"/>
+              <a:rPr lang="en-US" sz="2400" dirty="0"/>
               <a:t>Small sample size</a:t>
             </a:r>
           </a:p>
           <a:p>
             <a:pPr lvl="1"/>
             <a:r>
-              <a:rPr lang="en-US" dirty="0"/>
+              <a:rPr lang="en-US" sz="2400" dirty="0"/>
               <a:t>Constrained input variety</a:t>
             </a:r>
           </a:p>
           <a:p>
             <a:pPr lvl="1"/>
             <a:r>
-              <a:rPr lang="en-US" dirty="0"/>
+              <a:rPr lang="en-US" sz="2400" dirty="0"/>
               <a:t>Limits in cost/time</a:t>
             </a:r>
           </a:p>
           <a:p>
             <a:pPr lvl="1"/>
             <a:r>
-              <a:rPr lang="en-US" dirty="0"/>
+              <a:rPr lang="en-US" sz="2400" dirty="0"/>
               <a:t>Model opacity</a:t>
+            </a:r>
+          </a:p>
+          <a:p>
+            <a:pPr lvl="1"/>
+            <a:r>
+              <a:rPr lang="en-US" sz="2400" dirty="0"/>
+              <a:t>Short texts</a:t>
             </a:r>
           </a:p>
         </p:txBody>
@@ -17248,7 +17653,245 @@
 </p:sld>
 </file>
 
-<file path=ppt/slides/slide15.xml><?xml version="1.0" encoding="utf-8"?>
+<file path=ppt/slides/slide16.xml><?xml version="1.0" encoding="utf-8"?>
+<p:sld xmlns:a="http://schemas.openxmlformats.org/drawingml/2006/main" xmlns:r="http://schemas.openxmlformats.org/officeDocument/2006/relationships" xmlns:p="http://schemas.openxmlformats.org/presentationml/2006/main">
+  <p:cSld>
+    <p:spTree>
+      <p:nvGrpSpPr>
+        <p:cNvPr id="1" name=""/>
+        <p:cNvGrpSpPr/>
+        <p:nvPr/>
+      </p:nvGrpSpPr>
+      <p:grpSpPr>
+        <a:xfrm>
+          <a:off x="0" y="0"/>
+          <a:ext cx="0" cy="0"/>
+          <a:chOff x="0" y="0"/>
+          <a:chExt cx="0" cy="0"/>
+        </a:xfrm>
+      </p:grpSpPr>
+      <p:sp>
+        <p:nvSpPr>
+          <p:cNvPr id="2" name="Title 1">
+            <a:extLst>
+              <a:ext uri="{FF2B5EF4-FFF2-40B4-BE49-F238E27FC236}">
+                <a16:creationId xmlns:a16="http://schemas.microsoft.com/office/drawing/2014/main" id="{9D733DD8-7901-C110-B0B2-46D38663E6E6}"/>
+              </a:ext>
+            </a:extLst>
+          </p:cNvPr>
+          <p:cNvSpPr>
+            <a:spLocks noGrp="1"/>
+          </p:cNvSpPr>
+          <p:nvPr>
+            <p:ph type="title"/>
+          </p:nvPr>
+        </p:nvSpPr>
+        <p:spPr/>
+        <p:txBody>
+          <a:bodyPr/>
+          <a:lstStyle/>
+          <a:p>
+            <a:r>
+              <a:rPr lang="en-US" dirty="0"/>
+              <a:t>What Does ChatGPT Think? </a:t>
+            </a:r>
+          </a:p>
+        </p:txBody>
+      </p:sp>
+      <p:sp>
+        <p:nvSpPr>
+          <p:cNvPr id="3" name="Content Placeholder 2">
+            <a:extLst>
+              <a:ext uri="{FF2B5EF4-FFF2-40B4-BE49-F238E27FC236}">
+                <a16:creationId xmlns:a16="http://schemas.microsoft.com/office/drawing/2014/main" id="{8DE04A74-0203-A182-038C-1ECF7D14DF6B}"/>
+              </a:ext>
+            </a:extLst>
+          </p:cNvPr>
+          <p:cNvSpPr>
+            <a:spLocks noGrp="1"/>
+          </p:cNvSpPr>
+          <p:nvPr>
+            <p:ph idx="1"/>
+          </p:nvPr>
+        </p:nvSpPr>
+        <p:spPr/>
+        <p:txBody>
+          <a:bodyPr>
+            <a:normAutofit/>
+          </a:bodyPr>
+          <a:lstStyle/>
+          <a:p>
+            <a:r>
+              <a:rPr lang="en-US" sz="2800" dirty="0"/>
+              <a:t>Hey ChatGPT, do you think this writing is human or AI, and why?</a:t>
+            </a:r>
+            <a:endParaRPr lang="en-US" sz="2400" dirty="0"/>
+          </a:p>
+        </p:txBody>
+      </p:sp>
+      <p:pic>
+        <p:nvPicPr>
+          <p:cNvPr id="7" name="Picture 6" descr="Text&#10;&#10;Description automatically generated">
+            <a:extLst>
+              <a:ext uri="{FF2B5EF4-FFF2-40B4-BE49-F238E27FC236}">
+                <a16:creationId xmlns:a16="http://schemas.microsoft.com/office/drawing/2014/main" id="{A49DD255-E9DF-95E7-1471-64F0C877DAE1}"/>
+              </a:ext>
+            </a:extLst>
+          </p:cNvPr>
+          <p:cNvPicPr>
+            <a:picLocks noChangeAspect="1"/>
+          </p:cNvPicPr>
+          <p:nvPr/>
+        </p:nvPicPr>
+        <p:blipFill>
+          <a:blip r:embed="rId2"/>
+          <a:stretch>
+            <a:fillRect/>
+          </a:stretch>
+        </p:blipFill>
+        <p:spPr>
+          <a:xfrm>
+            <a:off x="1620445" y="3459409"/>
+            <a:ext cx="8951109" cy="2857953"/>
+          </a:xfrm>
+          <a:prstGeom prst="rect">
+            <a:avLst/>
+          </a:prstGeom>
+        </p:spPr>
+      </p:pic>
+    </p:spTree>
+    <p:extLst>
+      <p:ext uri="{BB962C8B-B14F-4D97-AF65-F5344CB8AC3E}">
+        <p14:creationId xmlns:p14="http://schemas.microsoft.com/office/powerpoint/2010/main" val="652490199"/>
+      </p:ext>
+    </p:extLst>
+  </p:cSld>
+  <p:clrMapOvr>
+    <a:masterClrMapping/>
+  </p:clrMapOvr>
+</p:sld>
+</file>
+
+<file path=ppt/slides/slide17.xml><?xml version="1.0" encoding="utf-8"?>
+<p:sld xmlns:a="http://schemas.openxmlformats.org/drawingml/2006/main" xmlns:r="http://schemas.openxmlformats.org/officeDocument/2006/relationships" xmlns:p="http://schemas.openxmlformats.org/presentationml/2006/main">
+  <p:cSld>
+    <p:spTree>
+      <p:nvGrpSpPr>
+        <p:cNvPr id="1" name=""/>
+        <p:cNvGrpSpPr/>
+        <p:nvPr/>
+      </p:nvGrpSpPr>
+      <p:grpSpPr>
+        <a:xfrm>
+          <a:off x="0" y="0"/>
+          <a:ext cx="0" cy="0"/>
+          <a:chOff x="0" y="0"/>
+          <a:chExt cx="0" cy="0"/>
+        </a:xfrm>
+      </p:grpSpPr>
+      <p:sp>
+        <p:nvSpPr>
+          <p:cNvPr id="2" name="Title 1">
+            <a:extLst>
+              <a:ext uri="{FF2B5EF4-FFF2-40B4-BE49-F238E27FC236}">
+                <a16:creationId xmlns:a16="http://schemas.microsoft.com/office/drawing/2014/main" id="{9D733DD8-7901-C110-B0B2-46D38663E6E6}"/>
+              </a:ext>
+            </a:extLst>
+          </p:cNvPr>
+          <p:cNvSpPr>
+            <a:spLocks noGrp="1"/>
+          </p:cNvSpPr>
+          <p:nvPr>
+            <p:ph type="title"/>
+          </p:nvPr>
+        </p:nvSpPr>
+        <p:spPr/>
+        <p:txBody>
+          <a:bodyPr/>
+          <a:lstStyle/>
+          <a:p>
+            <a:r>
+              <a:rPr lang="en-US" dirty="0"/>
+              <a:t>What Does ChatGPT Think?</a:t>
+            </a:r>
+          </a:p>
+        </p:txBody>
+      </p:sp>
+      <p:sp>
+        <p:nvSpPr>
+          <p:cNvPr id="3" name="Content Placeholder 2">
+            <a:extLst>
+              <a:ext uri="{FF2B5EF4-FFF2-40B4-BE49-F238E27FC236}">
+                <a16:creationId xmlns:a16="http://schemas.microsoft.com/office/drawing/2014/main" id="{8DE04A74-0203-A182-038C-1ECF7D14DF6B}"/>
+              </a:ext>
+            </a:extLst>
+          </p:cNvPr>
+          <p:cNvSpPr>
+            <a:spLocks noGrp="1"/>
+          </p:cNvSpPr>
+          <p:nvPr>
+            <p:ph idx="1"/>
+          </p:nvPr>
+        </p:nvSpPr>
+        <p:spPr/>
+        <p:txBody>
+          <a:bodyPr>
+            <a:normAutofit/>
+          </a:bodyPr>
+          <a:lstStyle/>
+          <a:p>
+            <a:r>
+              <a:rPr lang="en-US" sz="2800" dirty="0"/>
+              <a:t>Hey ChatGPT, do you think this writing is human or AI, and why?</a:t>
+            </a:r>
+            <a:endParaRPr lang="en-US" sz="2400" dirty="0"/>
+          </a:p>
+        </p:txBody>
+      </p:sp>
+      <p:pic>
+        <p:nvPicPr>
+          <p:cNvPr id="8" name="Picture 7" descr="Text&#10;&#10;Description automatically generated">
+            <a:extLst>
+              <a:ext uri="{FF2B5EF4-FFF2-40B4-BE49-F238E27FC236}">
+                <a16:creationId xmlns:a16="http://schemas.microsoft.com/office/drawing/2014/main" id="{3936E258-63F0-BEA8-5BB6-4F9DFAC24B9A}"/>
+              </a:ext>
+            </a:extLst>
+          </p:cNvPr>
+          <p:cNvPicPr>
+            <a:picLocks noChangeAspect="1"/>
+          </p:cNvPicPr>
+          <p:nvPr/>
+        </p:nvPicPr>
+        <p:blipFill>
+          <a:blip r:embed="rId2"/>
+          <a:stretch>
+            <a:fillRect/>
+          </a:stretch>
+        </p:blipFill>
+        <p:spPr>
+          <a:xfrm>
+            <a:off x="910048" y="3744297"/>
+            <a:ext cx="10371903" cy="2160270"/>
+          </a:xfrm>
+          <a:prstGeom prst="rect">
+            <a:avLst/>
+          </a:prstGeom>
+        </p:spPr>
+      </p:pic>
+    </p:spTree>
+    <p:extLst>
+      <p:ext uri="{BB962C8B-B14F-4D97-AF65-F5344CB8AC3E}">
+        <p14:creationId xmlns:p14="http://schemas.microsoft.com/office/powerpoint/2010/main" val="3349365269"/>
+      </p:ext>
+    </p:extLst>
+  </p:cSld>
+  <p:clrMapOvr>
+    <a:masterClrMapping/>
+  </p:clrMapOvr>
+</p:sld>
+</file>
+
+<file path=ppt/slides/slide18.xml><?xml version="1.0" encoding="utf-8"?>
 <p:sld xmlns:a="http://schemas.openxmlformats.org/drawingml/2006/main" xmlns:r="http://schemas.openxmlformats.org/officeDocument/2006/relationships" xmlns:p="http://schemas.openxmlformats.org/presentationml/2006/main">
   <p:cSld>
     <p:spTree>
@@ -17315,21 +17958,28 @@
           <a:lstStyle/>
           <a:p>
             <a:r>
-              <a:rPr lang="en-US" dirty="0"/>
+              <a:rPr lang="en-US" sz="2800" dirty="0"/>
               <a:t>Generate more data</a:t>
             </a:r>
           </a:p>
           <a:p>
             <a:r>
-              <a:rPr lang="en-US" dirty="0"/>
-              <a:t>Gather more diverse data set</a:t>
+              <a:rPr lang="en-US" sz="2800" dirty="0"/>
+              <a:t>Gather a more diverse data set</a:t>
             </a:r>
           </a:p>
           <a:p>
             <a:r>
-              <a:rPr lang="en-US" dirty="0"/>
+              <a:rPr lang="en-US" sz="2800" dirty="0"/>
               <a:t>Create different models that can take more parameters</a:t>
             </a:r>
+          </a:p>
+          <a:p>
+            <a:r>
+              <a:rPr lang="en-US" sz="2800" dirty="0"/>
+              <a:t>Explore prompt methods for creation and classification</a:t>
+            </a:r>
+            <a:endParaRPr lang="en-US" dirty="0"/>
           </a:p>
         </p:txBody>
       </p:sp>
@@ -17346,7 +17996,7 @@
 </p:sld>
 </file>
 
-<file path=ppt/slides/slide16.xml><?xml version="1.0" encoding="utf-8"?>
+<file path=ppt/slides/slide19.xml><?xml version="1.0" encoding="utf-8"?>
 <p:sld xmlns:a="http://schemas.openxmlformats.org/drawingml/2006/main" xmlns:r="http://schemas.openxmlformats.org/officeDocument/2006/relationships" xmlns:p="http://schemas.openxmlformats.org/presentationml/2006/main">
   <p:cSld>
     <p:spTree>
@@ -17635,6 +18285,118 @@
           <a:chExt cx="0" cy="0"/>
         </a:xfrm>
       </p:grpSpPr>
+      <p:sp>
+        <p:nvSpPr>
+          <p:cNvPr id="2" name="Title 1">
+            <a:extLst>
+              <a:ext uri="{FF2B5EF4-FFF2-40B4-BE49-F238E27FC236}">
+                <a16:creationId xmlns:a16="http://schemas.microsoft.com/office/drawing/2014/main" id="{45B9EF4B-429B-A002-82A5-51F47ACCD418}"/>
+              </a:ext>
+            </a:extLst>
+          </p:cNvPr>
+          <p:cNvSpPr>
+            <a:spLocks noGrp="1"/>
+          </p:cNvSpPr>
+          <p:nvPr>
+            <p:ph type="title"/>
+          </p:nvPr>
+        </p:nvSpPr>
+        <p:spPr/>
+        <p:txBody>
+          <a:bodyPr/>
+          <a:lstStyle/>
+          <a:p>
+            <a:r>
+              <a:rPr lang="en-US" dirty="0"/>
+              <a:t>History</a:t>
+            </a:r>
+          </a:p>
+        </p:txBody>
+      </p:sp>
+      <p:sp>
+        <p:nvSpPr>
+          <p:cNvPr id="3" name="Content Placeholder 2">
+            <a:extLst>
+              <a:ext uri="{FF2B5EF4-FFF2-40B4-BE49-F238E27FC236}">
+                <a16:creationId xmlns:a16="http://schemas.microsoft.com/office/drawing/2014/main" id="{69B6741D-4C11-9AD4-5F3A-2307F06E2A3A}"/>
+              </a:ext>
+            </a:extLst>
+          </p:cNvPr>
+          <p:cNvSpPr>
+            <a:spLocks noGrp="1"/>
+          </p:cNvSpPr>
+          <p:nvPr>
+            <p:ph idx="1"/>
+          </p:nvPr>
+        </p:nvSpPr>
+        <p:spPr/>
+        <p:txBody>
+          <a:bodyPr>
+            <a:normAutofit/>
+          </a:bodyPr>
+          <a:lstStyle/>
+          <a:p>
+            <a:r>
+              <a:rPr lang="en-US" sz="2800" dirty="0"/>
+              <a:t>LLM – Large Language Model</a:t>
+            </a:r>
+          </a:p>
+          <a:p>
+            <a:r>
+              <a:rPr lang="en-US" sz="2800" dirty="0"/>
+              <a:t>“Attention is All You Need” from Google</a:t>
+            </a:r>
+          </a:p>
+          <a:p>
+            <a:r>
+              <a:rPr lang="en-US" sz="2800" dirty="0"/>
+              <a:t>ChatGPT from </a:t>
+            </a:r>
+            <a:r>
+              <a:rPr lang="en-US" sz="2800" dirty="0" err="1"/>
+              <a:t>OpenAI</a:t>
+            </a:r>
+            <a:endParaRPr lang="en-US" sz="2800" dirty="0"/>
+          </a:p>
+          <a:p>
+            <a:pPr lvl="1"/>
+            <a:r>
+              <a:rPr lang="en-US" sz="2400" dirty="0"/>
+              <a:t>Model became publicly available and gained widespread usage overnight</a:t>
+            </a:r>
+          </a:p>
+        </p:txBody>
+      </p:sp>
+    </p:spTree>
+    <p:extLst>
+      <p:ext uri="{BB962C8B-B14F-4D97-AF65-F5344CB8AC3E}">
+        <p14:creationId xmlns:p14="http://schemas.microsoft.com/office/powerpoint/2010/main" val="3981161341"/>
+      </p:ext>
+    </p:extLst>
+  </p:cSld>
+  <p:clrMapOvr>
+    <a:masterClrMapping/>
+  </p:clrMapOvr>
+</p:sld>
+</file>
+
+<file path=ppt/slides/slide5.xml><?xml version="1.0" encoding="utf-8"?>
+<p:sld xmlns:a="http://schemas.openxmlformats.org/drawingml/2006/main" xmlns:r="http://schemas.openxmlformats.org/officeDocument/2006/relationships" xmlns:p="http://schemas.openxmlformats.org/presentationml/2006/main">
+  <p:cSld>
+    <p:spTree>
+      <p:nvGrpSpPr>
+        <p:cNvPr id="1" name=""/>
+        <p:cNvGrpSpPr/>
+        <p:nvPr/>
+      </p:nvGrpSpPr>
+      <p:grpSpPr>
+        <a:xfrm>
+          <a:off x="0" y="0"/>
+          <a:ext cx="0" cy="0"/>
+          <a:chOff x="0" y="0"/>
+          <a:chExt cx="0" cy="0"/>
+        </a:xfrm>
+      </p:grpSpPr>
       <p:pic>
         <p:nvPicPr>
           <p:cNvPr id="4" name="Picture 3">
@@ -17678,7 +18440,7 @@
 </p:sld>
 </file>
 
-<file path=ppt/slides/slide5.xml><?xml version="1.0" encoding="utf-8"?>
+<file path=ppt/slides/slide6.xml><?xml version="1.0" encoding="utf-8"?>
 <p:sld xmlns:a="http://schemas.openxmlformats.org/drawingml/2006/main" xmlns:r="http://schemas.openxmlformats.org/officeDocument/2006/relationships" xmlns:p="http://schemas.openxmlformats.org/presentationml/2006/main">
   <p:cSld>
     <p:spTree>
@@ -17741,33 +18503,34 @@
         </p:nvSpPr>
         <p:spPr/>
         <p:txBody>
-          <a:bodyPr/>
+          <a:bodyPr>
+            <a:normAutofit/>
+          </a:bodyPr>
           <a:lstStyle/>
           <a:p>
             <a:r>
-              <a:rPr lang="en-US" dirty="0"/>
-              <a:t>It’s difficult to detect </a:t>
-            </a:r>
-            <a:r>
-              <a:rPr lang="en-US" dirty="0" err="1"/>
-              <a:t>ChatGPT</a:t>
-            </a:r>
-            <a:r>
-              <a:rPr lang="en-US" dirty="0"/>
-              <a:t> content</a:t>
+              <a:rPr lang="en-US" sz="2800" dirty="0"/>
+              <a:t>ChatGPT is pretty darn good at writing</a:t>
             </a:r>
           </a:p>
           <a:p>
             <a:pPr lvl="1"/>
-            <a:endParaRPr lang="en-US" dirty="0"/>
-          </a:p>
-          <a:p>
-            <a:endParaRPr lang="en-US" dirty="0"/>
+            <a:r>
+              <a:rPr lang="en-US" sz="2600" dirty="0"/>
+              <a:t>Trained on human written text, so that’s what it writes</a:t>
+            </a:r>
           </a:p>
           <a:p>
             <a:r>
-              <a:rPr lang="en-US" dirty="0"/>
+              <a:rPr lang="en-US" sz="2800" dirty="0"/>
               <a:t>Current methods are inconsistent</a:t>
+            </a:r>
+          </a:p>
+          <a:p>
+            <a:pPr lvl="1"/>
+            <a:r>
+              <a:rPr lang="en-US" sz="2600" dirty="0"/>
+              <a:t>Code, non-English languages, and intentional errors</a:t>
             </a:r>
           </a:p>
         </p:txBody>
@@ -17785,7 +18548,7 @@
 </p:sld>
 </file>
 
-<file path=ppt/slides/slide6.xml><?xml version="1.0" encoding="utf-8"?>
+<file path=ppt/slides/slide7.xml><?xml version="1.0" encoding="utf-8"?>
 <p:sld xmlns:a="http://schemas.openxmlformats.org/drawingml/2006/main" xmlns:r="http://schemas.openxmlformats.org/officeDocument/2006/relationships" xmlns:p="http://schemas.openxmlformats.org/presentationml/2006/main">
   <p:cSld>
     <p:spTree>
@@ -17825,7 +18588,95 @@
           <a:p>
             <a:r>
               <a:rPr lang="en-US" dirty="0"/>
-              <a:t>Exploring Solutions</a:t>
+              <a:t>The Problem</a:t>
+            </a:r>
+          </a:p>
+        </p:txBody>
+      </p:sp>
+      <p:pic>
+        <p:nvPicPr>
+          <p:cNvPr id="7" name="Picture 6" descr="Text&#10;&#10;Description automatically generated">
+            <a:extLst>
+              <a:ext uri="{FF2B5EF4-FFF2-40B4-BE49-F238E27FC236}">
+                <a16:creationId xmlns:a16="http://schemas.microsoft.com/office/drawing/2014/main" id="{8C53472F-FD3D-87A2-2F88-8EB0F2A97ECA}"/>
+              </a:ext>
+            </a:extLst>
+          </p:cNvPr>
+          <p:cNvPicPr>
+            <a:picLocks noChangeAspect="1"/>
+          </p:cNvPicPr>
+          <p:nvPr/>
+        </p:nvPicPr>
+        <p:blipFill>
+          <a:blip r:embed="rId2"/>
+          <a:stretch>
+            <a:fillRect/>
+          </a:stretch>
+        </p:blipFill>
+        <p:spPr>
+          <a:xfrm>
+            <a:off x="543143" y="3067757"/>
+            <a:ext cx="11105713" cy="2216190"/>
+          </a:xfrm>
+          <a:prstGeom prst="rect">
+            <a:avLst/>
+          </a:prstGeom>
+        </p:spPr>
+      </p:pic>
+    </p:spTree>
+    <p:extLst>
+      <p:ext uri="{BB962C8B-B14F-4D97-AF65-F5344CB8AC3E}">
+        <p14:creationId xmlns:p14="http://schemas.microsoft.com/office/powerpoint/2010/main" val="247253499"/>
+      </p:ext>
+    </p:extLst>
+  </p:cSld>
+  <p:clrMapOvr>
+    <a:masterClrMapping/>
+  </p:clrMapOvr>
+</p:sld>
+</file>
+
+<file path=ppt/slides/slide8.xml><?xml version="1.0" encoding="utf-8"?>
+<p:sld xmlns:a="http://schemas.openxmlformats.org/drawingml/2006/main" xmlns:r="http://schemas.openxmlformats.org/officeDocument/2006/relationships" xmlns:p="http://schemas.openxmlformats.org/presentationml/2006/main">
+  <p:cSld>
+    <p:spTree>
+      <p:nvGrpSpPr>
+        <p:cNvPr id="1" name=""/>
+        <p:cNvGrpSpPr/>
+        <p:nvPr/>
+      </p:nvGrpSpPr>
+      <p:grpSpPr>
+        <a:xfrm>
+          <a:off x="0" y="0"/>
+          <a:ext cx="0" cy="0"/>
+          <a:chOff x="0" y="0"/>
+          <a:chExt cx="0" cy="0"/>
+        </a:xfrm>
+      </p:grpSpPr>
+      <p:sp>
+        <p:nvSpPr>
+          <p:cNvPr id="2" name="Title 1">
+            <a:extLst>
+              <a:ext uri="{FF2B5EF4-FFF2-40B4-BE49-F238E27FC236}">
+                <a16:creationId xmlns:a16="http://schemas.microsoft.com/office/drawing/2014/main" id="{45B9EF4B-429B-A002-82A5-51F47ACCD418}"/>
+              </a:ext>
+            </a:extLst>
+          </p:cNvPr>
+          <p:cNvSpPr>
+            <a:spLocks noGrp="1"/>
+          </p:cNvSpPr>
+          <p:nvPr>
+            <p:ph type="title"/>
+          </p:nvPr>
+        </p:nvSpPr>
+        <p:spPr/>
+        <p:txBody>
+          <a:bodyPr/>
+          <a:lstStyle/>
+          <a:p>
+            <a:r>
+              <a:rPr lang="en-US" dirty="0"/>
+              <a:t>Methodology</a:t>
             </a:r>
           </a:p>
         </p:txBody>
@@ -17851,39 +18702,43 @@
           <a:bodyPr/>
           <a:lstStyle/>
           <a:p>
-            <a:endParaRPr lang="en-US" dirty="0"/>
-          </a:p>
-          <a:p>
             <a:r>
-              <a:rPr lang="en-US" dirty="0"/>
-              <a:t>A machine learning model needs data!</a:t>
+              <a:rPr lang="en-US" sz="2800" dirty="0"/>
+              <a:t>Generate content using </a:t>
+            </a:r>
+            <a:r>
+              <a:rPr lang="en-US" sz="2800" dirty="0" err="1"/>
+              <a:t>OpenAI’s</a:t>
+            </a:r>
+            <a:r>
+              <a:rPr lang="en-US" sz="2800" dirty="0"/>
+              <a:t> API &amp; GPT 3.5 Turbo</a:t>
             </a:r>
           </a:p>
           <a:p>
             <a:r>
-              <a:rPr lang="en-US" dirty="0"/>
-              <a:t>We used </a:t>
-            </a:r>
-            <a:r>
-              <a:rPr lang="en-US" dirty="0" err="1"/>
-              <a:t>OpenAI’s</a:t>
-            </a:r>
-            <a:r>
-              <a:rPr lang="en-US" dirty="0"/>
-              <a:t> own API to generate lots of content</a:t>
+              <a:rPr lang="en-US" sz="2800" dirty="0"/>
+              <a:t>Medium Articles</a:t>
             </a:r>
           </a:p>
           <a:p>
             <a:r>
-              <a:rPr lang="en-US" dirty="0"/>
-              <a:t>That content is based on existing human-created content</a:t>
+              <a:rPr lang="en-US" sz="2800" dirty="0"/>
+              <a:t>Create models using the </a:t>
+            </a:r>
+            <a:r>
+              <a:rPr lang="en-US" sz="2800" dirty="0" err="1"/>
+              <a:t>OpenAI</a:t>
+            </a:r>
+            <a:r>
+              <a:rPr lang="en-US" sz="2800" dirty="0"/>
+              <a:t> Fine Tuning API</a:t>
             </a:r>
           </a:p>
           <a:p>
-            <a:pPr lvl="1"/>
             <a:r>
-              <a:rPr lang="en-US" dirty="0"/>
-              <a:t>Medium article dataset, filtered by topic</a:t>
+              <a:rPr lang="en-US" sz="2800" dirty="0"/>
+              <a:t>Analyze results</a:t>
             </a:r>
           </a:p>
           <a:p>
@@ -17897,7 +18752,7 @@
     </p:spTree>
     <p:extLst>
       <p:ext uri="{BB962C8B-B14F-4D97-AF65-F5344CB8AC3E}">
-        <p14:creationId xmlns:p14="http://schemas.microsoft.com/office/powerpoint/2010/main" val="4201517615"/>
+        <p14:creationId xmlns:p14="http://schemas.microsoft.com/office/powerpoint/2010/main" val="1662377062"/>
       </p:ext>
     </p:extLst>
   </p:cSld>
@@ -17907,7 +18762,7 @@
 </p:sld>
 </file>
 
-<file path=ppt/slides/slide7.xml><?xml version="1.0" encoding="utf-8"?>
+<file path=ppt/slides/slide9.xml><?xml version="1.0" encoding="utf-8"?>
 <p:sld xmlns:a="http://schemas.openxmlformats.org/drawingml/2006/main" xmlns:r="http://schemas.openxmlformats.org/officeDocument/2006/relationships" xmlns:p="http://schemas.openxmlformats.org/presentationml/2006/main">
   <p:cSld>
     <p:spTree>
@@ -18082,281 +18937,6 @@
     <p:extLst>
       <p:ext uri="{BB962C8B-B14F-4D97-AF65-F5344CB8AC3E}">
         <p14:creationId xmlns:p14="http://schemas.microsoft.com/office/powerpoint/2010/main" val="593375044"/>
-      </p:ext>
-    </p:extLst>
-  </p:cSld>
-  <p:clrMapOvr>
-    <a:masterClrMapping/>
-  </p:clrMapOvr>
-</p:sld>
-</file>
-
-<file path=ppt/slides/slide8.xml><?xml version="1.0" encoding="utf-8"?>
-<p:sld xmlns:a="http://schemas.openxmlformats.org/drawingml/2006/main" xmlns:r="http://schemas.openxmlformats.org/officeDocument/2006/relationships" xmlns:p="http://schemas.openxmlformats.org/presentationml/2006/main">
-  <p:cSld>
-    <p:spTree>
-      <p:nvGrpSpPr>
-        <p:cNvPr id="1" name=""/>
-        <p:cNvGrpSpPr/>
-        <p:nvPr/>
-      </p:nvGrpSpPr>
-      <p:grpSpPr>
-        <a:xfrm>
-          <a:off x="0" y="0"/>
-          <a:ext cx="0" cy="0"/>
-          <a:chOff x="0" y="0"/>
-          <a:chExt cx="0" cy="0"/>
-        </a:xfrm>
-      </p:grpSpPr>
-      <p:sp>
-        <p:nvSpPr>
-          <p:cNvPr id="2" name="Title 1">
-            <a:extLst>
-              <a:ext uri="{FF2B5EF4-FFF2-40B4-BE49-F238E27FC236}">
-                <a16:creationId xmlns:a16="http://schemas.microsoft.com/office/drawing/2014/main" id="{45B9EF4B-429B-A002-82A5-51F47ACCD418}"/>
-              </a:ext>
-            </a:extLst>
-          </p:cNvPr>
-          <p:cNvSpPr>
-            <a:spLocks noGrp="1"/>
-          </p:cNvSpPr>
-          <p:nvPr>
-            <p:ph type="title"/>
-          </p:nvPr>
-        </p:nvSpPr>
-        <p:spPr/>
-        <p:txBody>
-          <a:bodyPr/>
-          <a:lstStyle/>
-          <a:p>
-            <a:r>
-              <a:rPr lang="en-US" dirty="0"/>
-              <a:t>Methodology</a:t>
-            </a:r>
-          </a:p>
-        </p:txBody>
-      </p:sp>
-      <p:sp>
-        <p:nvSpPr>
-          <p:cNvPr id="3" name="Content Placeholder 2">
-            <a:extLst>
-              <a:ext uri="{FF2B5EF4-FFF2-40B4-BE49-F238E27FC236}">
-                <a16:creationId xmlns:a16="http://schemas.microsoft.com/office/drawing/2014/main" id="{69B6741D-4C11-9AD4-5F3A-2307F06E2A3A}"/>
-              </a:ext>
-            </a:extLst>
-          </p:cNvPr>
-          <p:cNvSpPr>
-            <a:spLocks noGrp="1"/>
-          </p:cNvSpPr>
-          <p:nvPr>
-            <p:ph idx="1"/>
-          </p:nvPr>
-        </p:nvSpPr>
-        <p:spPr/>
-        <p:txBody>
-          <a:bodyPr/>
-          <a:lstStyle/>
-          <a:p>
-            <a:endParaRPr lang="en-US" dirty="0"/>
-          </a:p>
-          <a:p>
-            <a:r>
-              <a:rPr lang="en-US" dirty="0"/>
-              <a:t>Generate content using </a:t>
-            </a:r>
-            <a:r>
-              <a:rPr lang="en-US" dirty="0" err="1"/>
-              <a:t>OpenAI’s</a:t>
-            </a:r>
-            <a:r>
-              <a:rPr lang="en-US" dirty="0"/>
-              <a:t> API</a:t>
-            </a:r>
-          </a:p>
-          <a:p>
-            <a:r>
-              <a:rPr lang="en-US" dirty="0"/>
-              <a:t>Prepare data for processing</a:t>
-            </a:r>
-          </a:p>
-          <a:p>
-            <a:r>
-              <a:rPr lang="en-US" dirty="0"/>
-              <a:t>Create models using the </a:t>
-            </a:r>
-            <a:r>
-              <a:rPr lang="en-US" dirty="0" err="1"/>
-              <a:t>OpenAI</a:t>
-            </a:r>
-            <a:r>
-              <a:rPr lang="en-US" dirty="0"/>
-              <a:t> Fine Tuning API</a:t>
-            </a:r>
-          </a:p>
-          <a:p>
-            <a:r>
-              <a:rPr lang="en-US" dirty="0"/>
-              <a:t>Analyze results</a:t>
-            </a:r>
-          </a:p>
-          <a:p>
-            <a:pPr marL="0" indent="0">
-              <a:buNone/>
-            </a:pPr>
-            <a:endParaRPr lang="en-US" dirty="0"/>
-          </a:p>
-        </p:txBody>
-      </p:sp>
-    </p:spTree>
-    <p:extLst>
-      <p:ext uri="{BB962C8B-B14F-4D97-AF65-F5344CB8AC3E}">
-        <p14:creationId xmlns:p14="http://schemas.microsoft.com/office/powerpoint/2010/main" val="1662377062"/>
-      </p:ext>
-    </p:extLst>
-  </p:cSld>
-  <p:clrMapOvr>
-    <a:masterClrMapping/>
-  </p:clrMapOvr>
-</p:sld>
-</file>
-
-<file path=ppt/slides/slide9.xml><?xml version="1.0" encoding="utf-8"?>
-<p:sld xmlns:a="http://schemas.openxmlformats.org/drawingml/2006/main" xmlns:r="http://schemas.openxmlformats.org/officeDocument/2006/relationships" xmlns:p="http://schemas.openxmlformats.org/presentationml/2006/main">
-  <p:cSld>
-    <p:spTree>
-      <p:nvGrpSpPr>
-        <p:cNvPr id="1" name=""/>
-        <p:cNvGrpSpPr/>
-        <p:nvPr/>
-      </p:nvGrpSpPr>
-      <p:grpSpPr>
-        <a:xfrm>
-          <a:off x="0" y="0"/>
-          <a:ext cx="0" cy="0"/>
-          <a:chOff x="0" y="0"/>
-          <a:chExt cx="0" cy="0"/>
-        </a:xfrm>
-      </p:grpSpPr>
-      <p:sp>
-        <p:nvSpPr>
-          <p:cNvPr id="2" name="Title 1">
-            <a:extLst>
-              <a:ext uri="{FF2B5EF4-FFF2-40B4-BE49-F238E27FC236}">
-                <a16:creationId xmlns:a16="http://schemas.microsoft.com/office/drawing/2014/main" id="{45B9EF4B-429B-A002-82A5-51F47ACCD418}"/>
-              </a:ext>
-            </a:extLst>
-          </p:cNvPr>
-          <p:cNvSpPr>
-            <a:spLocks noGrp="1"/>
-          </p:cNvSpPr>
-          <p:nvPr>
-            <p:ph type="title"/>
-          </p:nvPr>
-        </p:nvSpPr>
-        <p:spPr/>
-        <p:txBody>
-          <a:bodyPr/>
-          <a:lstStyle/>
-          <a:p>
-            <a:r>
-              <a:rPr lang="en-US" dirty="0"/>
-              <a:t>Experiment 1</a:t>
-            </a:r>
-          </a:p>
-        </p:txBody>
-      </p:sp>
-      <p:sp>
-        <p:nvSpPr>
-          <p:cNvPr id="3" name="Content Placeholder 2">
-            <a:extLst>
-              <a:ext uri="{FF2B5EF4-FFF2-40B4-BE49-F238E27FC236}">
-                <a16:creationId xmlns:a16="http://schemas.microsoft.com/office/drawing/2014/main" id="{69B6741D-4C11-9AD4-5F3A-2307F06E2A3A}"/>
-              </a:ext>
-            </a:extLst>
-          </p:cNvPr>
-          <p:cNvSpPr>
-            <a:spLocks noGrp="1"/>
-          </p:cNvSpPr>
-          <p:nvPr>
-            <p:ph idx="1"/>
-          </p:nvPr>
-        </p:nvSpPr>
-        <p:spPr/>
-        <p:txBody>
-          <a:bodyPr/>
-          <a:lstStyle/>
-          <a:p>
-            <a:endParaRPr lang="en-US" dirty="0"/>
-          </a:p>
-          <a:p>
-            <a:r>
-              <a:rPr lang="en-US" dirty="0"/>
-              <a:t>Getting </a:t>
-            </a:r>
-            <a:r>
-              <a:rPr lang="en-US" dirty="0" err="1"/>
-              <a:t>ChatGPT</a:t>
-            </a:r>
-            <a:r>
-              <a:rPr lang="en-US" dirty="0"/>
-              <a:t> to create content in the style of human writers in  </a:t>
-            </a:r>
-          </a:p>
-          <a:p>
-            <a:pPr lvl="2"/>
-            <a:r>
-              <a:rPr lang="en-US" dirty="0"/>
-              <a:t>6</a:t>
-            </a:r>
-            <a:r>
-              <a:rPr lang="en-US" baseline="30000" dirty="0"/>
-              <a:t>th</a:t>
-            </a:r>
-            <a:r>
-              <a:rPr lang="en-US" dirty="0"/>
-              <a:t> grade</a:t>
-            </a:r>
-          </a:p>
-          <a:p>
-            <a:pPr lvl="2"/>
-            <a:r>
-              <a:rPr lang="en-US" dirty="0"/>
-              <a:t>10</a:t>
-            </a:r>
-            <a:r>
-              <a:rPr lang="en-US" baseline="30000" dirty="0"/>
-              <a:t>th</a:t>
-            </a:r>
-            <a:r>
-              <a:rPr lang="en-US" dirty="0"/>
-              <a:t> grade</a:t>
-            </a:r>
-          </a:p>
-          <a:p>
-            <a:pPr lvl="2"/>
-            <a:r>
-              <a:rPr lang="en-US" dirty="0"/>
-              <a:t>College</a:t>
-            </a:r>
-          </a:p>
-          <a:p>
-            <a:r>
-              <a:rPr lang="en-US" dirty="0"/>
-              <a:t>Running dataset through classification model</a:t>
-            </a:r>
-          </a:p>
-          <a:p>
-            <a:pPr marL="0" indent="0">
-              <a:buNone/>
-            </a:pPr>
-            <a:endParaRPr lang="en-US" dirty="0"/>
-          </a:p>
-        </p:txBody>
-      </p:sp>
-    </p:spTree>
-    <p:extLst>
-      <p:ext uri="{BB962C8B-B14F-4D97-AF65-F5344CB8AC3E}">
-        <p14:creationId xmlns:p14="http://schemas.microsoft.com/office/powerpoint/2010/main" val="2226708957"/>
       </p:ext>
     </p:extLst>
   </p:cSld>

</xml_diff>